<commit_message>
added content about list function and named elements.
</commit_message>
<xml_diff>
--- a/markdown/images/rprog-lexicalScopingDiagrams.pptx
+++ b/markdown/images/rprog-lexicalScopingDiagrams.pptx
@@ -6,6 +6,7 @@
   </p:sldMasterIdLst>
   <p:sldIdLst>
     <p:sldId id="256" r:id="rId2"/>
+    <p:sldId id="257" r:id="rId3"/>
   </p:sldIdLst>
   <p:sldSz cx="12192000" cy="6858000"/>
   <p:notesSz cx="6858000" cy="9144000"/>
@@ -104,6 +105,11 @@
       </a:defRPr>
     </a:lvl9pPr>
   </p:defaultTextStyle>
+  <p:extLst>
+    <p:ext uri="{EFAFB233-063F-42B5-8137-9DF3F51BA10A}">
+      <p15:sldGuideLst xmlns:p15="http://schemas.microsoft.com/office/powerpoint/2012/main"/>
+    </p:ext>
+  </p:extLst>
 </p:presentation>
 </file>
 
@@ -149,10 +155,9 @@
           </a:lstStyle>
           <a:p>
             <a:r>
-              <a:rPr lang="en-US" smtClean="0"/>
+              <a:rPr lang="en-US"/>
               <a:t>Click to edit Master title style</a:t>
             </a:r>
-            <a:endParaRPr lang="en-US"/>
           </a:p>
         </p:txBody>
       </p:sp>
@@ -214,10 +219,9 @@
           </a:lstStyle>
           <a:p>
             <a:r>
-              <a:rPr lang="en-US" smtClean="0"/>
+              <a:rPr lang="en-US"/>
               <a:t>Click to edit Master subtitle style</a:t>
             </a:r>
-            <a:endParaRPr lang="en-US"/>
           </a:p>
         </p:txBody>
       </p:sp>
@@ -332,10 +336,9 @@
           <a:lstStyle/>
           <a:p>
             <a:r>
-              <a:rPr lang="en-US" smtClean="0"/>
+              <a:rPr lang="en-US"/>
               <a:t>Click to edit Master title style</a:t>
             </a:r>
-            <a:endParaRPr lang="en-US"/>
           </a:p>
         </p:txBody>
       </p:sp>
@@ -356,38 +359,37 @@
           <a:p>
             <a:pPr lvl="0"/>
             <a:r>
-              <a:rPr lang="en-US" smtClean="0"/>
+              <a:rPr lang="en-US"/>
               <a:t>Click to edit Master text styles</a:t>
             </a:r>
           </a:p>
           <a:p>
             <a:pPr lvl="1"/>
             <a:r>
-              <a:rPr lang="en-US" smtClean="0"/>
+              <a:rPr lang="en-US"/>
               <a:t>Second level</a:t>
             </a:r>
           </a:p>
           <a:p>
             <a:pPr lvl="2"/>
             <a:r>
-              <a:rPr lang="en-US" smtClean="0"/>
+              <a:rPr lang="en-US"/>
               <a:t>Third level</a:t>
             </a:r>
           </a:p>
           <a:p>
             <a:pPr lvl="3"/>
             <a:r>
-              <a:rPr lang="en-US" smtClean="0"/>
+              <a:rPr lang="en-US"/>
               <a:t>Fourth level</a:t>
             </a:r>
           </a:p>
           <a:p>
             <a:pPr lvl="4"/>
             <a:r>
-              <a:rPr lang="en-US" smtClean="0"/>
+              <a:rPr lang="en-US"/>
               <a:t>Fifth level</a:t>
             </a:r>
-            <a:endParaRPr lang="en-US"/>
           </a:p>
         </p:txBody>
       </p:sp>
@@ -507,10 +509,9 @@
           <a:lstStyle/>
           <a:p>
             <a:r>
-              <a:rPr lang="en-US" smtClean="0"/>
+              <a:rPr lang="en-US"/>
               <a:t>Click to edit Master title style</a:t>
             </a:r>
-            <a:endParaRPr lang="en-US"/>
           </a:p>
         </p:txBody>
       </p:sp>
@@ -536,38 +537,37 @@
           <a:p>
             <a:pPr lvl="0"/>
             <a:r>
-              <a:rPr lang="en-US" smtClean="0"/>
+              <a:rPr lang="en-US"/>
               <a:t>Click to edit Master text styles</a:t>
             </a:r>
           </a:p>
           <a:p>
             <a:pPr lvl="1"/>
             <a:r>
-              <a:rPr lang="en-US" smtClean="0"/>
+              <a:rPr lang="en-US"/>
               <a:t>Second level</a:t>
             </a:r>
           </a:p>
           <a:p>
             <a:pPr lvl="2"/>
             <a:r>
-              <a:rPr lang="en-US" smtClean="0"/>
+              <a:rPr lang="en-US"/>
               <a:t>Third level</a:t>
             </a:r>
           </a:p>
           <a:p>
             <a:pPr lvl="3"/>
             <a:r>
-              <a:rPr lang="en-US" smtClean="0"/>
+              <a:rPr lang="en-US"/>
               <a:t>Fourth level</a:t>
             </a:r>
           </a:p>
           <a:p>
             <a:pPr lvl="4"/>
             <a:r>
-              <a:rPr lang="en-US" smtClean="0"/>
+              <a:rPr lang="en-US"/>
               <a:t>Fifth level</a:t>
             </a:r>
-            <a:endParaRPr lang="en-US"/>
           </a:p>
         </p:txBody>
       </p:sp>
@@ -682,10 +682,9 @@
           <a:lstStyle/>
           <a:p>
             <a:r>
-              <a:rPr lang="en-US" smtClean="0"/>
+              <a:rPr lang="en-US"/>
               <a:t>Click to edit Master title style</a:t>
             </a:r>
-            <a:endParaRPr lang="en-US"/>
           </a:p>
         </p:txBody>
       </p:sp>
@@ -706,38 +705,37 @@
           <a:p>
             <a:pPr lvl="0"/>
             <a:r>
-              <a:rPr lang="en-US" smtClean="0"/>
+              <a:rPr lang="en-US"/>
               <a:t>Click to edit Master text styles</a:t>
             </a:r>
           </a:p>
           <a:p>
             <a:pPr lvl="1"/>
             <a:r>
-              <a:rPr lang="en-US" smtClean="0"/>
+              <a:rPr lang="en-US"/>
               <a:t>Second level</a:t>
             </a:r>
           </a:p>
           <a:p>
             <a:pPr lvl="2"/>
             <a:r>
-              <a:rPr lang="en-US" smtClean="0"/>
+              <a:rPr lang="en-US"/>
               <a:t>Third level</a:t>
             </a:r>
           </a:p>
           <a:p>
             <a:pPr lvl="3"/>
             <a:r>
-              <a:rPr lang="en-US" smtClean="0"/>
+              <a:rPr lang="en-US"/>
               <a:t>Fourth level</a:t>
             </a:r>
           </a:p>
           <a:p>
             <a:pPr lvl="4"/>
             <a:r>
-              <a:rPr lang="en-US" smtClean="0"/>
+              <a:rPr lang="en-US"/>
               <a:t>Fifth level</a:t>
             </a:r>
-            <a:endParaRPr lang="en-US"/>
           </a:p>
         </p:txBody>
       </p:sp>
@@ -861,10 +859,9 @@
           </a:lstStyle>
           <a:p>
             <a:r>
-              <a:rPr lang="en-US" smtClean="0"/>
+              <a:rPr lang="en-US"/>
               <a:t>Click to edit Master title style</a:t>
             </a:r>
-            <a:endParaRPr lang="en-US"/>
           </a:p>
         </p:txBody>
       </p:sp>
@@ -981,7 +978,7 @@
           <a:p>
             <a:pPr lvl="0"/>
             <a:r>
-              <a:rPr lang="en-US" smtClean="0"/>
+              <a:rPr lang="en-US"/>
               <a:t>Click to edit Master text styles</a:t>
             </a:r>
           </a:p>
@@ -1098,10 +1095,9 @@
           <a:lstStyle/>
           <a:p>
             <a:r>
-              <a:rPr lang="en-US" smtClean="0"/>
+              <a:rPr lang="en-US"/>
               <a:t>Click to edit Master title style</a:t>
             </a:r>
-            <a:endParaRPr lang="en-US"/>
           </a:p>
         </p:txBody>
       </p:sp>
@@ -1127,38 +1123,37 @@
           <a:p>
             <a:pPr lvl="0"/>
             <a:r>
-              <a:rPr lang="en-US" smtClean="0"/>
+              <a:rPr lang="en-US"/>
               <a:t>Click to edit Master text styles</a:t>
             </a:r>
           </a:p>
           <a:p>
             <a:pPr lvl="1"/>
             <a:r>
-              <a:rPr lang="en-US" smtClean="0"/>
+              <a:rPr lang="en-US"/>
               <a:t>Second level</a:t>
             </a:r>
           </a:p>
           <a:p>
             <a:pPr lvl="2"/>
             <a:r>
-              <a:rPr lang="en-US" smtClean="0"/>
+              <a:rPr lang="en-US"/>
               <a:t>Third level</a:t>
             </a:r>
           </a:p>
           <a:p>
             <a:pPr lvl="3"/>
             <a:r>
-              <a:rPr lang="en-US" smtClean="0"/>
+              <a:rPr lang="en-US"/>
               <a:t>Fourth level</a:t>
             </a:r>
           </a:p>
           <a:p>
             <a:pPr lvl="4"/>
             <a:r>
-              <a:rPr lang="en-US" smtClean="0"/>
+              <a:rPr lang="en-US"/>
               <a:t>Fifth level</a:t>
             </a:r>
-            <a:endParaRPr lang="en-US"/>
           </a:p>
         </p:txBody>
       </p:sp>
@@ -1184,38 +1179,37 @@
           <a:p>
             <a:pPr lvl="0"/>
             <a:r>
-              <a:rPr lang="en-US" smtClean="0"/>
+              <a:rPr lang="en-US"/>
               <a:t>Click to edit Master text styles</a:t>
             </a:r>
           </a:p>
           <a:p>
             <a:pPr lvl="1"/>
             <a:r>
-              <a:rPr lang="en-US" smtClean="0"/>
+              <a:rPr lang="en-US"/>
               <a:t>Second level</a:t>
             </a:r>
           </a:p>
           <a:p>
             <a:pPr lvl="2"/>
             <a:r>
-              <a:rPr lang="en-US" smtClean="0"/>
+              <a:rPr lang="en-US"/>
               <a:t>Third level</a:t>
             </a:r>
           </a:p>
           <a:p>
             <a:pPr lvl="3"/>
             <a:r>
-              <a:rPr lang="en-US" smtClean="0"/>
+              <a:rPr lang="en-US"/>
               <a:t>Fourth level</a:t>
             </a:r>
           </a:p>
           <a:p>
             <a:pPr lvl="4"/>
             <a:r>
-              <a:rPr lang="en-US" smtClean="0"/>
+              <a:rPr lang="en-US"/>
               <a:t>Fifth level</a:t>
             </a:r>
-            <a:endParaRPr lang="en-US"/>
           </a:p>
         </p:txBody>
       </p:sp>
@@ -1335,10 +1329,9 @@
           <a:lstStyle/>
           <a:p>
             <a:r>
-              <a:rPr lang="en-US" smtClean="0"/>
+              <a:rPr lang="en-US"/>
               <a:t>Click to edit Master title style</a:t>
             </a:r>
-            <a:endParaRPr lang="en-US"/>
           </a:p>
         </p:txBody>
       </p:sp>
@@ -1401,7 +1394,7 @@
           <a:p>
             <a:pPr lvl="0"/>
             <a:r>
-              <a:rPr lang="en-US" smtClean="0"/>
+              <a:rPr lang="en-US"/>
               <a:t>Click to edit Master text styles</a:t>
             </a:r>
           </a:p>
@@ -1429,38 +1422,37 @@
           <a:p>
             <a:pPr lvl="0"/>
             <a:r>
-              <a:rPr lang="en-US" smtClean="0"/>
+              <a:rPr lang="en-US"/>
               <a:t>Click to edit Master text styles</a:t>
             </a:r>
           </a:p>
           <a:p>
             <a:pPr lvl="1"/>
             <a:r>
-              <a:rPr lang="en-US" smtClean="0"/>
+              <a:rPr lang="en-US"/>
               <a:t>Second level</a:t>
             </a:r>
           </a:p>
           <a:p>
             <a:pPr lvl="2"/>
             <a:r>
-              <a:rPr lang="en-US" smtClean="0"/>
+              <a:rPr lang="en-US"/>
               <a:t>Third level</a:t>
             </a:r>
           </a:p>
           <a:p>
             <a:pPr lvl="3"/>
             <a:r>
-              <a:rPr lang="en-US" smtClean="0"/>
+              <a:rPr lang="en-US"/>
               <a:t>Fourth level</a:t>
             </a:r>
           </a:p>
           <a:p>
             <a:pPr lvl="4"/>
             <a:r>
-              <a:rPr lang="en-US" smtClean="0"/>
+              <a:rPr lang="en-US"/>
               <a:t>Fifth level</a:t>
             </a:r>
-            <a:endParaRPr lang="en-US"/>
           </a:p>
         </p:txBody>
       </p:sp>
@@ -1523,7 +1515,7 @@
           <a:p>
             <a:pPr lvl="0"/>
             <a:r>
-              <a:rPr lang="en-US" smtClean="0"/>
+              <a:rPr lang="en-US"/>
               <a:t>Click to edit Master text styles</a:t>
             </a:r>
           </a:p>
@@ -1551,38 +1543,37 @@
           <a:p>
             <a:pPr lvl="0"/>
             <a:r>
-              <a:rPr lang="en-US" smtClean="0"/>
+              <a:rPr lang="en-US"/>
               <a:t>Click to edit Master text styles</a:t>
             </a:r>
           </a:p>
           <a:p>
             <a:pPr lvl="1"/>
             <a:r>
-              <a:rPr lang="en-US" smtClean="0"/>
+              <a:rPr lang="en-US"/>
               <a:t>Second level</a:t>
             </a:r>
           </a:p>
           <a:p>
             <a:pPr lvl="2"/>
             <a:r>
-              <a:rPr lang="en-US" smtClean="0"/>
+              <a:rPr lang="en-US"/>
               <a:t>Third level</a:t>
             </a:r>
           </a:p>
           <a:p>
             <a:pPr lvl="3"/>
             <a:r>
-              <a:rPr lang="en-US" smtClean="0"/>
+              <a:rPr lang="en-US"/>
               <a:t>Fourth level</a:t>
             </a:r>
           </a:p>
           <a:p>
             <a:pPr lvl="4"/>
             <a:r>
-              <a:rPr lang="en-US" smtClean="0"/>
+              <a:rPr lang="en-US"/>
               <a:t>Fifth level</a:t>
             </a:r>
-            <a:endParaRPr lang="en-US"/>
           </a:p>
         </p:txBody>
       </p:sp>
@@ -1697,10 +1688,9 @@
           <a:lstStyle/>
           <a:p>
             <a:r>
-              <a:rPr lang="en-US" smtClean="0"/>
+              <a:rPr lang="en-US"/>
               <a:t>Click to edit Master title style</a:t>
             </a:r>
-            <a:endParaRPr lang="en-US"/>
           </a:p>
         </p:txBody>
       </p:sp>
@@ -1919,10 +1909,9 @@
           </a:lstStyle>
           <a:p>
             <a:r>
-              <a:rPr lang="en-US" smtClean="0"/>
+              <a:rPr lang="en-US"/>
               <a:t>Click to edit Master title style</a:t>
             </a:r>
-            <a:endParaRPr lang="en-US"/>
           </a:p>
         </p:txBody>
       </p:sp>
@@ -1976,38 +1965,37 @@
           <a:p>
             <a:pPr lvl="0"/>
             <a:r>
-              <a:rPr lang="en-US" smtClean="0"/>
+              <a:rPr lang="en-US"/>
               <a:t>Click to edit Master text styles</a:t>
             </a:r>
           </a:p>
           <a:p>
             <a:pPr lvl="1"/>
             <a:r>
-              <a:rPr lang="en-US" smtClean="0"/>
+              <a:rPr lang="en-US"/>
               <a:t>Second level</a:t>
             </a:r>
           </a:p>
           <a:p>
             <a:pPr lvl="2"/>
             <a:r>
-              <a:rPr lang="en-US" smtClean="0"/>
+              <a:rPr lang="en-US"/>
               <a:t>Third level</a:t>
             </a:r>
           </a:p>
           <a:p>
             <a:pPr lvl="3"/>
             <a:r>
-              <a:rPr lang="en-US" smtClean="0"/>
+              <a:rPr lang="en-US"/>
               <a:t>Fourth level</a:t>
             </a:r>
           </a:p>
           <a:p>
             <a:pPr lvl="4"/>
             <a:r>
-              <a:rPr lang="en-US" smtClean="0"/>
+              <a:rPr lang="en-US"/>
               <a:t>Fifth level</a:t>
             </a:r>
-            <a:endParaRPr lang="en-US"/>
           </a:p>
         </p:txBody>
       </p:sp>
@@ -2070,7 +2058,7 @@
           <a:p>
             <a:pPr lvl="0"/>
             <a:r>
-              <a:rPr lang="en-US" smtClean="0"/>
+              <a:rPr lang="en-US"/>
               <a:t>Click to edit Master text styles</a:t>
             </a:r>
           </a:p>
@@ -2196,10 +2184,9 @@
           </a:lstStyle>
           <a:p>
             <a:r>
-              <a:rPr lang="en-US" smtClean="0"/>
+              <a:rPr lang="en-US"/>
               <a:t>Click to edit Master title style</a:t>
             </a:r>
-            <a:endParaRPr lang="en-US"/>
           </a:p>
         </p:txBody>
       </p:sp>
@@ -2323,7 +2310,7 @@
           <a:p>
             <a:pPr lvl="0"/>
             <a:r>
-              <a:rPr lang="en-US" smtClean="0"/>
+              <a:rPr lang="en-US"/>
               <a:t>Click to edit Master text styles</a:t>
             </a:r>
           </a:p>
@@ -2455,10 +2442,9 @@
           <a:lstStyle/>
           <a:p>
             <a:r>
-              <a:rPr lang="en-US" smtClean="0"/>
+              <a:rPr lang="en-US"/>
               <a:t>Click to edit Master title style</a:t>
             </a:r>
-            <a:endParaRPr lang="en-US"/>
           </a:p>
         </p:txBody>
       </p:sp>
@@ -2489,38 +2475,37 @@
           <a:p>
             <a:pPr lvl="0"/>
             <a:r>
-              <a:rPr lang="en-US" smtClean="0"/>
+              <a:rPr lang="en-US"/>
               <a:t>Click to edit Master text styles</a:t>
             </a:r>
           </a:p>
           <a:p>
             <a:pPr lvl="1"/>
             <a:r>
-              <a:rPr lang="en-US" smtClean="0"/>
+              <a:rPr lang="en-US"/>
               <a:t>Second level</a:t>
             </a:r>
           </a:p>
           <a:p>
             <a:pPr lvl="2"/>
             <a:r>
-              <a:rPr lang="en-US" smtClean="0"/>
+              <a:rPr lang="en-US"/>
               <a:t>Third level</a:t>
             </a:r>
           </a:p>
           <a:p>
             <a:pPr lvl="3"/>
             <a:r>
-              <a:rPr lang="en-US" smtClean="0"/>
+              <a:rPr lang="en-US"/>
               <a:t>Fourth level</a:t>
             </a:r>
           </a:p>
           <a:p>
             <a:pPr lvl="4"/>
             <a:r>
-              <a:rPr lang="en-US" smtClean="0"/>
+              <a:rPr lang="en-US"/>
               <a:t>Fifth level</a:t>
             </a:r>
-            <a:endParaRPr lang="en-US"/>
           </a:p>
         </p:txBody>
       </p:sp>
@@ -3027,7 +3012,7 @@
           <a:lstStyle/>
           <a:p>
             <a:r>
-              <a:rPr lang="en-US" sz="1600" dirty="0" smtClean="0">
+              <a:rPr lang="en-US" sz="1600" dirty="0">
                 <a:solidFill>
                   <a:schemeClr val="bg1"/>
                 </a:solidFill>
@@ -3035,12 +3020,6 @@
               </a:rPr>
               <a:t>Global Environment</a:t>
             </a:r>
-            <a:endParaRPr lang="en-US" sz="1600" dirty="0">
-              <a:solidFill>
-                <a:schemeClr val="bg1"/>
-              </a:solidFill>
-              <a:latin typeface="Lucida Console" panose="020B0609040504020204" pitchFamily="49" charset="0"/>
-            </a:endParaRPr>
           </a:p>
         </p:txBody>
       </p:sp>
@@ -3113,20 +3092,17 @@
           <a:lstStyle/>
           <a:p>
             <a:r>
-              <a:rPr lang="en-US" sz="1600" dirty="0" err="1" smtClean="0">
+              <a:rPr lang="en-US" sz="1600" dirty="0" err="1">
                 <a:latin typeface="Lucida Console" panose="020B0609040504020204" pitchFamily="49" charset="0"/>
               </a:rPr>
               <a:t>makeCacheVector</a:t>
             </a:r>
             <a:r>
-              <a:rPr lang="en-US" sz="1600" dirty="0" smtClean="0">
+              <a:rPr lang="en-US" sz="1600" dirty="0">
                 <a:latin typeface="Lucida Console" panose="020B0609040504020204" pitchFamily="49" charset="0"/>
               </a:rPr>
               <a:t>(x)</a:t>
             </a:r>
-            <a:endParaRPr lang="en-US" sz="1600" dirty="0">
-              <a:latin typeface="Lucida Console" panose="020B0609040504020204" pitchFamily="49" charset="0"/>
-            </a:endParaRPr>
           </a:p>
         </p:txBody>
       </p:sp>
@@ -3202,14 +3178,11 @@
           <a:lstStyle/>
           <a:p>
             <a:r>
-              <a:rPr lang="en-US" sz="1400" dirty="0" smtClean="0">
+              <a:rPr lang="en-US" sz="1400" dirty="0">
                 <a:latin typeface="Lucida Console" panose="020B0609040504020204" pitchFamily="49" charset="0"/>
               </a:rPr>
               <a:t>set(y)</a:t>
             </a:r>
-            <a:endParaRPr lang="en-US" sz="1400" dirty="0">
-              <a:latin typeface="Lucida Console" panose="020B0609040504020204" pitchFamily="49" charset="0"/>
-            </a:endParaRPr>
           </a:p>
         </p:txBody>
       </p:sp>
@@ -3285,14 +3258,11 @@
           <a:lstStyle/>
           <a:p>
             <a:r>
-              <a:rPr lang="en-US" sz="1400" dirty="0" smtClean="0">
+              <a:rPr lang="en-US" sz="1400" dirty="0">
                 <a:latin typeface="Lucida Console" panose="020B0609040504020204" pitchFamily="49" charset="0"/>
               </a:rPr>
               <a:t>get()</a:t>
             </a:r>
-            <a:endParaRPr lang="en-US" sz="1400" dirty="0">
-              <a:latin typeface="Lucida Console" panose="020B0609040504020204" pitchFamily="49" charset="0"/>
-            </a:endParaRPr>
           </a:p>
         </p:txBody>
       </p:sp>
@@ -3304,7 +3274,7 @@
         </p:nvSpPr>
         <p:spPr>
           <a:xfrm>
-            <a:off x="2855778" y="2006599"/>
+            <a:off x="2457569" y="2006599"/>
             <a:ext cx="1718906" cy="715377"/>
           </a:xfrm>
           <a:prstGeom prst="rect">
@@ -3349,7 +3319,7 @@
         </p:nvSpPr>
         <p:spPr>
           <a:xfrm>
-            <a:off x="2881178" y="2031999"/>
+            <a:off x="2571465" y="2031999"/>
             <a:ext cx="1580882" cy="307777"/>
           </a:xfrm>
           <a:prstGeom prst="rect">
@@ -3368,20 +3338,17 @@
           <a:lstStyle/>
           <a:p>
             <a:r>
-              <a:rPr lang="en-US" sz="1400" dirty="0" err="1" smtClean="0">
+              <a:rPr lang="en-US" sz="1400" dirty="0" err="1">
                 <a:latin typeface="Lucida Console" panose="020B0609040504020204" pitchFamily="49" charset="0"/>
               </a:rPr>
               <a:t>setmean</a:t>
             </a:r>
             <a:r>
-              <a:rPr lang="en-US" sz="1400" dirty="0" smtClean="0">
+              <a:rPr lang="en-US" sz="1400" dirty="0">
                 <a:latin typeface="Lucida Console" panose="020B0609040504020204" pitchFamily="49" charset="0"/>
               </a:rPr>
               <a:t>(mean)</a:t>
             </a:r>
-            <a:endParaRPr lang="en-US" sz="1400" dirty="0">
-              <a:latin typeface="Lucida Console" panose="020B0609040504020204" pitchFamily="49" charset="0"/>
-            </a:endParaRPr>
           </a:p>
         </p:txBody>
       </p:sp>
@@ -3393,7 +3360,7 @@
         </p:nvSpPr>
         <p:spPr>
           <a:xfrm>
-            <a:off x="2855778" y="2866021"/>
+            <a:off x="2457569" y="2866021"/>
             <a:ext cx="1718906" cy="715377"/>
           </a:xfrm>
           <a:prstGeom prst="rect">
@@ -3438,7 +3405,7 @@
         </p:nvSpPr>
         <p:spPr>
           <a:xfrm>
-            <a:off x="2881178" y="2891421"/>
+            <a:off x="2571465" y="2891421"/>
             <a:ext cx="1151277" cy="307777"/>
           </a:xfrm>
           <a:prstGeom prst="rect">
@@ -3457,20 +3424,17 @@
           <a:lstStyle/>
           <a:p>
             <a:r>
-              <a:rPr lang="en-US" sz="1400" dirty="0" err="1" smtClean="0">
+              <a:rPr lang="en-US" sz="1400" dirty="0" err="1">
                 <a:latin typeface="Lucida Console" panose="020B0609040504020204" pitchFamily="49" charset="0"/>
               </a:rPr>
               <a:t>getmean</a:t>
             </a:r>
             <a:r>
-              <a:rPr lang="en-US" sz="1400" dirty="0" smtClean="0">
+              <a:rPr lang="en-US" sz="1400" dirty="0">
                 <a:latin typeface="Lucida Console" panose="020B0609040504020204" pitchFamily="49" charset="0"/>
               </a:rPr>
               <a:t>()</a:t>
             </a:r>
-            <a:endParaRPr lang="en-US" sz="1400" dirty="0">
-              <a:latin typeface="Lucida Console" panose="020B0609040504020204" pitchFamily="49" charset="0"/>
-            </a:endParaRPr>
           </a:p>
         </p:txBody>
       </p:sp>
@@ -3482,7 +3446,7 @@
         </p:nvSpPr>
         <p:spPr>
           <a:xfrm>
-            <a:off x="4663584" y="2031999"/>
+            <a:off x="4353871" y="2031999"/>
             <a:ext cx="292068" cy="307777"/>
           </a:xfrm>
           <a:prstGeom prst="rect">
@@ -3501,7 +3465,7 @@
           <a:lstStyle/>
           <a:p>
             <a:r>
-              <a:rPr lang="en-US" sz="1400" dirty="0" smtClean="0">
+              <a:rPr lang="en-US" sz="1400" dirty="0">
                 <a:solidFill>
                   <a:schemeClr val="accent1">
                     <a:lumMod val="50000"/>
@@ -3513,9 +3477,7 @@
             </a:r>
             <a:endParaRPr lang="en-US" sz="1400" dirty="0">
               <a:solidFill>
-                <a:schemeClr val="accent1">
-                  <a:lumMod val="50000"/>
-                </a:schemeClr>
+                <a:srgbClr val="FF0000"/>
               </a:solidFill>
               <a:latin typeface="Lucida Console" panose="020B0609040504020204" pitchFamily="49" charset="0"/>
             </a:endParaRPr>
@@ -3530,7 +3492,7 @@
         </p:nvSpPr>
         <p:spPr>
           <a:xfrm>
-            <a:off x="5153037" y="2031999"/>
+            <a:off x="4353871" y="2445852"/>
             <a:ext cx="292068" cy="307777"/>
           </a:xfrm>
           <a:prstGeom prst="rect">
@@ -3549,7 +3511,7 @@
           <a:lstStyle/>
           <a:p>
             <a:r>
-              <a:rPr lang="en-US" sz="1400" dirty="0" smtClean="0">
+              <a:rPr lang="en-US" sz="1400" dirty="0">
                 <a:solidFill>
                   <a:schemeClr val="accent1">
                     <a:lumMod val="50000"/>
@@ -3559,14 +3521,6 @@
               </a:rPr>
               <a:t>m</a:t>
             </a:r>
-            <a:endParaRPr lang="en-US" sz="1400" dirty="0">
-              <a:solidFill>
-                <a:schemeClr val="accent1">
-                  <a:lumMod val="50000"/>
-                </a:schemeClr>
-              </a:solidFill>
-              <a:latin typeface="Lucida Console" panose="020B0609040504020204" pitchFamily="49" charset="0"/>
-            </a:endParaRPr>
           </a:p>
         </p:txBody>
       </p:sp>
@@ -3597,7 +3551,7 @@
           <a:lstStyle/>
           <a:p>
             <a:r>
-              <a:rPr lang="en-US" sz="1400" dirty="0" smtClean="0">
+              <a:rPr lang="en-US" sz="1400" dirty="0">
                 <a:solidFill>
                   <a:schemeClr val="accent1">
                     <a:lumMod val="50000"/>
@@ -3607,14 +3561,6 @@
               </a:rPr>
               <a:t>y</a:t>
             </a:r>
-            <a:endParaRPr lang="en-US" sz="1400" dirty="0">
-              <a:solidFill>
-                <a:schemeClr val="accent1">
-                  <a:lumMod val="50000"/>
-                </a:schemeClr>
-              </a:solidFill>
-              <a:latin typeface="Lucida Console" panose="020B0609040504020204" pitchFamily="49" charset="0"/>
-            </a:endParaRPr>
           </a:p>
         </p:txBody>
       </p:sp>
@@ -3626,7 +3572,7 @@
         </p:nvSpPr>
         <p:spPr>
           <a:xfrm>
-            <a:off x="2908213" y="2340100"/>
+            <a:off x="2598500" y="2340100"/>
             <a:ext cx="614271" cy="307777"/>
           </a:xfrm>
           <a:prstGeom prst="rect">
@@ -3645,7 +3591,7 @@
           <a:lstStyle/>
           <a:p>
             <a:r>
-              <a:rPr lang="en-US" sz="1400" dirty="0" smtClean="0">
+              <a:rPr lang="en-US" sz="1400" dirty="0">
                 <a:solidFill>
                   <a:schemeClr val="accent1">
                     <a:lumMod val="50000"/>
@@ -3655,14 +3601,6 @@
               </a:rPr>
               <a:t>mean</a:t>
             </a:r>
-            <a:endParaRPr lang="en-US" sz="1400" dirty="0">
-              <a:solidFill>
-                <a:schemeClr val="accent1">
-                  <a:lumMod val="50000"/>
-                </a:schemeClr>
-              </a:solidFill>
-              <a:latin typeface="Lucida Console" panose="020B0609040504020204" pitchFamily="49" charset="0"/>
-            </a:endParaRPr>
           </a:p>
         </p:txBody>
       </p:sp>
@@ -3670,6 +3608,691 @@
     <p:extLst>
       <p:ext uri="{BB962C8B-B14F-4D97-AF65-F5344CB8AC3E}">
         <p14:creationId xmlns:p14="http://schemas.microsoft.com/office/powerpoint/2010/main" val="1303121284"/>
+      </p:ext>
+    </p:extLst>
+  </p:cSld>
+  <p:clrMapOvr>
+    <a:masterClrMapping/>
+  </p:clrMapOvr>
+</p:sld>
+</file>
+
+<file path=ppt/slides/slide2.xml><?xml version="1.0" encoding="utf-8"?>
+<p:sld xmlns:a="http://schemas.openxmlformats.org/drawingml/2006/main" xmlns:r="http://schemas.openxmlformats.org/officeDocument/2006/relationships" xmlns:p="http://schemas.openxmlformats.org/presentationml/2006/main">
+  <p:cSld>
+    <p:spTree>
+      <p:nvGrpSpPr>
+        <p:cNvPr id="1" name=""/>
+        <p:cNvGrpSpPr/>
+        <p:nvPr/>
+      </p:nvGrpSpPr>
+      <p:grpSpPr>
+        <a:xfrm>
+          <a:off x="0" y="0"/>
+          <a:ext cx="0" cy="0"/>
+          <a:chOff x="0" y="0"/>
+          <a:chExt cx="0" cy="0"/>
+        </a:xfrm>
+      </p:grpSpPr>
+      <p:sp>
+        <p:nvSpPr>
+          <p:cNvPr id="2" name="Rectangle 1"/>
+          <p:cNvSpPr/>
+          <p:nvPr/>
+        </p:nvSpPr>
+        <p:spPr>
+          <a:xfrm>
+            <a:off x="876300" y="990600"/>
+            <a:ext cx="5080000" cy="3429000"/>
+          </a:xfrm>
+          <a:prstGeom prst="rect">
+            <a:avLst/>
+          </a:prstGeom>
+        </p:spPr>
+        <p:style>
+          <a:lnRef idx="2">
+            <a:schemeClr val="accent1">
+              <a:shade val="50000"/>
+            </a:schemeClr>
+          </a:lnRef>
+          <a:fillRef idx="1">
+            <a:schemeClr val="accent1"/>
+          </a:fillRef>
+          <a:effectRef idx="0">
+            <a:schemeClr val="accent1"/>
+          </a:effectRef>
+          <a:fontRef idx="minor">
+            <a:schemeClr val="lt1"/>
+          </a:fontRef>
+        </p:style>
+        <p:txBody>
+          <a:bodyPr rtlCol="0" anchor="ctr"/>
+          <a:lstStyle/>
+          <a:p>
+            <a:pPr algn="ctr"/>
+            <a:endParaRPr lang="en-US"/>
+          </a:p>
+        </p:txBody>
+      </p:sp>
+      <p:sp>
+        <p:nvSpPr>
+          <p:cNvPr id="3" name="TextBox 2"/>
+          <p:cNvSpPr txBox="1"/>
+          <p:nvPr/>
+        </p:nvSpPr>
+        <p:spPr>
+          <a:xfrm>
+            <a:off x="876300" y="990600"/>
+            <a:ext cx="2406428" cy="338554"/>
+          </a:xfrm>
+          <a:prstGeom prst="rect">
+            <a:avLst/>
+          </a:prstGeom>
+          <a:noFill/>
+        </p:spPr>
+        <p:txBody>
+          <a:bodyPr wrap="none" rtlCol="0">
+            <a:spAutoFit/>
+          </a:bodyPr>
+          <a:lstStyle/>
+          <a:p>
+            <a:r>
+              <a:rPr lang="en-US" sz="1600" dirty="0">
+                <a:solidFill>
+                  <a:schemeClr val="bg1"/>
+                </a:solidFill>
+                <a:latin typeface="Lucida Console" panose="020B0609040504020204" pitchFamily="49" charset="0"/>
+              </a:rPr>
+              <a:t>Global Environment</a:t>
+            </a:r>
+          </a:p>
+        </p:txBody>
+      </p:sp>
+      <p:sp>
+        <p:nvSpPr>
+          <p:cNvPr id="4" name="Rectangle 3"/>
+          <p:cNvSpPr/>
+          <p:nvPr/>
+        </p:nvSpPr>
+        <p:spPr>
+          <a:xfrm>
+            <a:off x="977900" y="1536699"/>
+            <a:ext cx="4559300" cy="2254333"/>
+          </a:xfrm>
+          <a:prstGeom prst="rect">
+            <a:avLst/>
+          </a:prstGeom>
+          <a:solidFill>
+            <a:schemeClr val="accent1">
+              <a:lumMod val="40000"/>
+              <a:lumOff val="60000"/>
+            </a:schemeClr>
+          </a:solidFill>
+        </p:spPr>
+        <p:style>
+          <a:lnRef idx="2">
+            <a:schemeClr val="accent1">
+              <a:shade val="50000"/>
+            </a:schemeClr>
+          </a:lnRef>
+          <a:fillRef idx="1">
+            <a:schemeClr val="accent1"/>
+          </a:fillRef>
+          <a:effectRef idx="0">
+            <a:schemeClr val="accent1"/>
+          </a:effectRef>
+          <a:fontRef idx="minor">
+            <a:schemeClr val="lt1"/>
+          </a:fontRef>
+        </p:style>
+        <p:txBody>
+          <a:bodyPr rtlCol="0" anchor="ctr"/>
+          <a:lstStyle/>
+          <a:p>
+            <a:pPr algn="ctr"/>
+            <a:endParaRPr lang="en-US"/>
+          </a:p>
+        </p:txBody>
+      </p:sp>
+      <p:sp>
+        <p:nvSpPr>
+          <p:cNvPr id="5" name="TextBox 4"/>
+          <p:cNvSpPr txBox="1"/>
+          <p:nvPr/>
+        </p:nvSpPr>
+        <p:spPr>
+          <a:xfrm>
+            <a:off x="938015" y="1566277"/>
+            <a:ext cx="1172116" cy="338554"/>
+          </a:xfrm>
+          <a:prstGeom prst="rect">
+            <a:avLst/>
+          </a:prstGeom>
+          <a:noFill/>
+        </p:spPr>
+        <p:txBody>
+          <a:bodyPr wrap="none" rtlCol="0">
+            <a:spAutoFit/>
+          </a:bodyPr>
+          <a:lstStyle/>
+          <a:p>
+            <a:r>
+              <a:rPr lang="en-US" sz="1600" dirty="0" err="1">
+                <a:latin typeface="Lucida Console" panose="020B0609040504020204" pitchFamily="49" charset="0"/>
+              </a:rPr>
+              <a:t>myVector</a:t>
+            </a:r>
+            <a:endParaRPr lang="en-US" sz="1600" dirty="0">
+              <a:latin typeface="Lucida Console" panose="020B0609040504020204" pitchFamily="49" charset="0"/>
+            </a:endParaRPr>
+          </a:p>
+        </p:txBody>
+      </p:sp>
+      <p:sp>
+        <p:nvSpPr>
+          <p:cNvPr id="6" name="Rectangle 5"/>
+          <p:cNvSpPr/>
+          <p:nvPr/>
+        </p:nvSpPr>
+        <p:spPr>
+          <a:xfrm>
+            <a:off x="1143000" y="2006599"/>
+            <a:ext cx="1190460" cy="715377"/>
+          </a:xfrm>
+          <a:prstGeom prst="rect">
+            <a:avLst/>
+          </a:prstGeom>
+          <a:solidFill>
+            <a:schemeClr val="bg1">
+              <a:lumMod val="95000"/>
+            </a:schemeClr>
+          </a:solidFill>
+        </p:spPr>
+        <p:style>
+          <a:lnRef idx="2">
+            <a:schemeClr val="accent1">
+              <a:shade val="50000"/>
+            </a:schemeClr>
+          </a:lnRef>
+          <a:fillRef idx="1">
+            <a:schemeClr val="accent1"/>
+          </a:fillRef>
+          <a:effectRef idx="0">
+            <a:schemeClr val="accent1"/>
+          </a:effectRef>
+          <a:fontRef idx="minor">
+            <a:schemeClr val="lt1"/>
+          </a:fontRef>
+        </p:style>
+        <p:txBody>
+          <a:bodyPr rtlCol="0" anchor="ctr"/>
+          <a:lstStyle/>
+          <a:p>
+            <a:pPr algn="ctr"/>
+            <a:endParaRPr lang="en-US" sz="1600"/>
+          </a:p>
+        </p:txBody>
+      </p:sp>
+      <p:sp>
+        <p:nvSpPr>
+          <p:cNvPr id="7" name="TextBox 6"/>
+          <p:cNvSpPr txBox="1"/>
+          <p:nvPr/>
+        </p:nvSpPr>
+        <p:spPr>
+          <a:xfrm>
+            <a:off x="1168400" y="2044699"/>
+            <a:ext cx="829073" cy="307777"/>
+          </a:xfrm>
+          <a:prstGeom prst="rect">
+            <a:avLst/>
+          </a:prstGeom>
+          <a:solidFill>
+            <a:schemeClr val="bg1">
+              <a:lumMod val="95000"/>
+            </a:schemeClr>
+          </a:solidFill>
+        </p:spPr>
+        <p:txBody>
+          <a:bodyPr wrap="none" rtlCol="0">
+            <a:spAutoFit/>
+          </a:bodyPr>
+          <a:lstStyle/>
+          <a:p>
+            <a:r>
+              <a:rPr lang="en-US" sz="1400" dirty="0">
+                <a:latin typeface="Lucida Console" panose="020B0609040504020204" pitchFamily="49" charset="0"/>
+              </a:rPr>
+              <a:t>set(y)</a:t>
+            </a:r>
+          </a:p>
+        </p:txBody>
+      </p:sp>
+      <p:sp>
+        <p:nvSpPr>
+          <p:cNvPr id="8" name="Rectangle 7"/>
+          <p:cNvSpPr/>
+          <p:nvPr/>
+        </p:nvSpPr>
+        <p:spPr>
+          <a:xfrm>
+            <a:off x="1123089" y="2908299"/>
+            <a:ext cx="1190460" cy="715377"/>
+          </a:xfrm>
+          <a:prstGeom prst="rect">
+            <a:avLst/>
+          </a:prstGeom>
+          <a:solidFill>
+            <a:schemeClr val="bg1">
+              <a:lumMod val="95000"/>
+            </a:schemeClr>
+          </a:solidFill>
+        </p:spPr>
+        <p:style>
+          <a:lnRef idx="2">
+            <a:schemeClr val="accent1">
+              <a:shade val="50000"/>
+            </a:schemeClr>
+          </a:lnRef>
+          <a:fillRef idx="1">
+            <a:schemeClr val="accent1"/>
+          </a:fillRef>
+          <a:effectRef idx="0">
+            <a:schemeClr val="accent1"/>
+          </a:effectRef>
+          <a:fontRef idx="minor">
+            <a:schemeClr val="lt1"/>
+          </a:fontRef>
+        </p:style>
+        <p:txBody>
+          <a:bodyPr rtlCol="0" anchor="ctr"/>
+          <a:lstStyle/>
+          <a:p>
+            <a:pPr algn="ctr"/>
+            <a:endParaRPr lang="en-US" sz="1600"/>
+          </a:p>
+        </p:txBody>
+      </p:sp>
+      <p:sp>
+        <p:nvSpPr>
+          <p:cNvPr id="9" name="TextBox 8"/>
+          <p:cNvSpPr txBox="1"/>
+          <p:nvPr/>
+        </p:nvSpPr>
+        <p:spPr>
+          <a:xfrm>
+            <a:off x="1148489" y="2933699"/>
+            <a:ext cx="721672" cy="307777"/>
+          </a:xfrm>
+          <a:prstGeom prst="rect">
+            <a:avLst/>
+          </a:prstGeom>
+          <a:solidFill>
+            <a:schemeClr val="bg1">
+              <a:lumMod val="95000"/>
+            </a:schemeClr>
+          </a:solidFill>
+        </p:spPr>
+        <p:txBody>
+          <a:bodyPr wrap="none" rtlCol="0">
+            <a:spAutoFit/>
+          </a:bodyPr>
+          <a:lstStyle/>
+          <a:p>
+            <a:r>
+              <a:rPr lang="en-US" sz="1400" dirty="0">
+                <a:latin typeface="Lucida Console" panose="020B0609040504020204" pitchFamily="49" charset="0"/>
+              </a:rPr>
+              <a:t>get()</a:t>
+            </a:r>
+          </a:p>
+        </p:txBody>
+      </p:sp>
+      <p:sp>
+        <p:nvSpPr>
+          <p:cNvPr id="10" name="Rectangle 9"/>
+          <p:cNvSpPr/>
+          <p:nvPr/>
+        </p:nvSpPr>
+        <p:spPr>
+          <a:xfrm>
+            <a:off x="2457569" y="2006599"/>
+            <a:ext cx="1718906" cy="715377"/>
+          </a:xfrm>
+          <a:prstGeom prst="rect">
+            <a:avLst/>
+          </a:prstGeom>
+          <a:solidFill>
+            <a:schemeClr val="bg1">
+              <a:lumMod val="95000"/>
+            </a:schemeClr>
+          </a:solidFill>
+        </p:spPr>
+        <p:style>
+          <a:lnRef idx="2">
+            <a:schemeClr val="accent1">
+              <a:shade val="50000"/>
+            </a:schemeClr>
+          </a:lnRef>
+          <a:fillRef idx="1">
+            <a:schemeClr val="accent1"/>
+          </a:fillRef>
+          <a:effectRef idx="0">
+            <a:schemeClr val="accent1"/>
+          </a:effectRef>
+          <a:fontRef idx="minor">
+            <a:schemeClr val="lt1"/>
+          </a:fontRef>
+        </p:style>
+        <p:txBody>
+          <a:bodyPr rtlCol="0" anchor="ctr"/>
+          <a:lstStyle/>
+          <a:p>
+            <a:pPr algn="ctr"/>
+            <a:endParaRPr lang="en-US" sz="1600"/>
+          </a:p>
+        </p:txBody>
+      </p:sp>
+      <p:sp>
+        <p:nvSpPr>
+          <p:cNvPr id="11" name="TextBox 10"/>
+          <p:cNvSpPr txBox="1"/>
+          <p:nvPr/>
+        </p:nvSpPr>
+        <p:spPr>
+          <a:xfrm>
+            <a:off x="2571465" y="2031999"/>
+            <a:ext cx="1580882" cy="307777"/>
+          </a:xfrm>
+          <a:prstGeom prst="rect">
+            <a:avLst/>
+          </a:prstGeom>
+          <a:solidFill>
+            <a:schemeClr val="bg1">
+              <a:lumMod val="95000"/>
+            </a:schemeClr>
+          </a:solidFill>
+        </p:spPr>
+        <p:txBody>
+          <a:bodyPr wrap="none" rtlCol="0">
+            <a:spAutoFit/>
+          </a:bodyPr>
+          <a:lstStyle/>
+          <a:p>
+            <a:r>
+              <a:rPr lang="en-US" sz="1400" dirty="0" err="1">
+                <a:latin typeface="Lucida Console" panose="020B0609040504020204" pitchFamily="49" charset="0"/>
+              </a:rPr>
+              <a:t>setmean</a:t>
+            </a:r>
+            <a:r>
+              <a:rPr lang="en-US" sz="1400" dirty="0">
+                <a:latin typeface="Lucida Console" panose="020B0609040504020204" pitchFamily="49" charset="0"/>
+              </a:rPr>
+              <a:t>(mean)</a:t>
+            </a:r>
+          </a:p>
+        </p:txBody>
+      </p:sp>
+      <p:sp>
+        <p:nvSpPr>
+          <p:cNvPr id="12" name="Rectangle 11"/>
+          <p:cNvSpPr/>
+          <p:nvPr/>
+        </p:nvSpPr>
+        <p:spPr>
+          <a:xfrm>
+            <a:off x="2457569" y="2866021"/>
+            <a:ext cx="1718906" cy="715377"/>
+          </a:xfrm>
+          <a:prstGeom prst="rect">
+            <a:avLst/>
+          </a:prstGeom>
+          <a:solidFill>
+            <a:schemeClr val="bg1">
+              <a:lumMod val="95000"/>
+            </a:schemeClr>
+          </a:solidFill>
+        </p:spPr>
+        <p:style>
+          <a:lnRef idx="2">
+            <a:schemeClr val="accent1">
+              <a:shade val="50000"/>
+            </a:schemeClr>
+          </a:lnRef>
+          <a:fillRef idx="1">
+            <a:schemeClr val="accent1"/>
+          </a:fillRef>
+          <a:effectRef idx="0">
+            <a:schemeClr val="accent1"/>
+          </a:effectRef>
+          <a:fontRef idx="minor">
+            <a:schemeClr val="lt1"/>
+          </a:fontRef>
+        </p:style>
+        <p:txBody>
+          <a:bodyPr rtlCol="0" anchor="ctr"/>
+          <a:lstStyle/>
+          <a:p>
+            <a:pPr algn="ctr"/>
+            <a:endParaRPr lang="en-US" sz="1600"/>
+          </a:p>
+        </p:txBody>
+      </p:sp>
+      <p:sp>
+        <p:nvSpPr>
+          <p:cNvPr id="13" name="TextBox 12"/>
+          <p:cNvSpPr txBox="1"/>
+          <p:nvPr/>
+        </p:nvSpPr>
+        <p:spPr>
+          <a:xfrm>
+            <a:off x="2571465" y="2891421"/>
+            <a:ext cx="1151277" cy="307777"/>
+          </a:xfrm>
+          <a:prstGeom prst="rect">
+            <a:avLst/>
+          </a:prstGeom>
+          <a:solidFill>
+            <a:schemeClr val="bg1">
+              <a:lumMod val="95000"/>
+            </a:schemeClr>
+          </a:solidFill>
+        </p:spPr>
+        <p:txBody>
+          <a:bodyPr wrap="none" rtlCol="0">
+            <a:spAutoFit/>
+          </a:bodyPr>
+          <a:lstStyle/>
+          <a:p>
+            <a:r>
+              <a:rPr lang="en-US" sz="1400" dirty="0" err="1">
+                <a:latin typeface="Lucida Console" panose="020B0609040504020204" pitchFamily="49" charset="0"/>
+              </a:rPr>
+              <a:t>getmean</a:t>
+            </a:r>
+            <a:r>
+              <a:rPr lang="en-US" sz="1400" dirty="0">
+                <a:latin typeface="Lucida Console" panose="020B0609040504020204" pitchFamily="49" charset="0"/>
+              </a:rPr>
+              <a:t>()</a:t>
+            </a:r>
+          </a:p>
+        </p:txBody>
+      </p:sp>
+      <p:sp>
+        <p:nvSpPr>
+          <p:cNvPr id="14" name="TextBox 13"/>
+          <p:cNvSpPr txBox="1"/>
+          <p:nvPr/>
+        </p:nvSpPr>
+        <p:spPr>
+          <a:xfrm>
+            <a:off x="4353871" y="2031999"/>
+            <a:ext cx="1043876" cy="307777"/>
+          </a:xfrm>
+          <a:prstGeom prst="rect">
+            <a:avLst/>
+          </a:prstGeom>
+          <a:solidFill>
+            <a:schemeClr val="bg1">
+              <a:lumMod val="95000"/>
+            </a:schemeClr>
+          </a:solidFill>
+        </p:spPr>
+        <p:txBody>
+          <a:bodyPr wrap="none" rtlCol="0">
+            <a:spAutoFit/>
+          </a:bodyPr>
+          <a:lstStyle/>
+          <a:p>
+            <a:r>
+              <a:rPr lang="en-US" sz="1400" dirty="0">
+                <a:solidFill>
+                  <a:schemeClr val="accent1">
+                    <a:lumMod val="50000"/>
+                  </a:schemeClr>
+                </a:solidFill>
+                <a:latin typeface="Lucida Console" panose="020B0609040504020204" pitchFamily="49" charset="0"/>
+              </a:rPr>
+              <a:t>x = </a:t>
+            </a:r>
+            <a:r>
+              <a:rPr lang="en-US" sz="1400" dirty="0">
+                <a:solidFill>
+                  <a:srgbClr val="FF0000"/>
+                </a:solidFill>
+                <a:latin typeface="Lucida Console" panose="020B0609040504020204" pitchFamily="49" charset="0"/>
+              </a:rPr>
+              <a:t>1:15</a:t>
+            </a:r>
+          </a:p>
+        </p:txBody>
+      </p:sp>
+      <p:sp>
+        <p:nvSpPr>
+          <p:cNvPr id="15" name="TextBox 14"/>
+          <p:cNvSpPr txBox="1"/>
+          <p:nvPr/>
+        </p:nvSpPr>
+        <p:spPr>
+          <a:xfrm>
+            <a:off x="4353871" y="2445852"/>
+            <a:ext cx="292068" cy="307777"/>
+          </a:xfrm>
+          <a:prstGeom prst="rect">
+            <a:avLst/>
+          </a:prstGeom>
+          <a:solidFill>
+            <a:schemeClr val="bg1">
+              <a:lumMod val="95000"/>
+            </a:schemeClr>
+          </a:solidFill>
+        </p:spPr>
+        <p:txBody>
+          <a:bodyPr wrap="none" rtlCol="0">
+            <a:spAutoFit/>
+          </a:bodyPr>
+          <a:lstStyle/>
+          <a:p>
+            <a:r>
+              <a:rPr lang="en-US" sz="1400" dirty="0">
+                <a:solidFill>
+                  <a:schemeClr val="accent1">
+                    <a:lumMod val="50000"/>
+                  </a:schemeClr>
+                </a:solidFill>
+                <a:latin typeface="Lucida Console" panose="020B0609040504020204" pitchFamily="49" charset="0"/>
+              </a:rPr>
+              <a:t>m</a:t>
+            </a:r>
+          </a:p>
+        </p:txBody>
+      </p:sp>
+      <p:sp>
+        <p:nvSpPr>
+          <p:cNvPr id="16" name="TextBox 15"/>
+          <p:cNvSpPr txBox="1"/>
+          <p:nvPr/>
+        </p:nvSpPr>
+        <p:spPr>
+          <a:xfrm>
+            <a:off x="1168400" y="2340100"/>
+            <a:ext cx="292068" cy="307777"/>
+          </a:xfrm>
+          <a:prstGeom prst="rect">
+            <a:avLst/>
+          </a:prstGeom>
+          <a:solidFill>
+            <a:schemeClr val="bg1">
+              <a:lumMod val="95000"/>
+            </a:schemeClr>
+          </a:solidFill>
+        </p:spPr>
+        <p:txBody>
+          <a:bodyPr wrap="none" rtlCol="0">
+            <a:spAutoFit/>
+          </a:bodyPr>
+          <a:lstStyle/>
+          <a:p>
+            <a:r>
+              <a:rPr lang="en-US" sz="1400" dirty="0">
+                <a:solidFill>
+                  <a:schemeClr val="accent1">
+                    <a:lumMod val="50000"/>
+                  </a:schemeClr>
+                </a:solidFill>
+                <a:latin typeface="Lucida Console" panose="020B0609040504020204" pitchFamily="49" charset="0"/>
+              </a:rPr>
+              <a:t>y</a:t>
+            </a:r>
+          </a:p>
+        </p:txBody>
+      </p:sp>
+      <p:sp>
+        <p:nvSpPr>
+          <p:cNvPr id="17" name="TextBox 16"/>
+          <p:cNvSpPr txBox="1"/>
+          <p:nvPr/>
+        </p:nvSpPr>
+        <p:spPr>
+          <a:xfrm>
+            <a:off x="2598500" y="2340100"/>
+            <a:ext cx="614271" cy="307777"/>
+          </a:xfrm>
+          <a:prstGeom prst="rect">
+            <a:avLst/>
+          </a:prstGeom>
+          <a:solidFill>
+            <a:schemeClr val="bg1">
+              <a:lumMod val="95000"/>
+            </a:schemeClr>
+          </a:solidFill>
+        </p:spPr>
+        <p:txBody>
+          <a:bodyPr wrap="none" rtlCol="0">
+            <a:spAutoFit/>
+          </a:bodyPr>
+          <a:lstStyle/>
+          <a:p>
+            <a:r>
+              <a:rPr lang="en-US" sz="1400" dirty="0">
+                <a:solidFill>
+                  <a:schemeClr val="accent1">
+                    <a:lumMod val="50000"/>
+                  </a:schemeClr>
+                </a:solidFill>
+                <a:latin typeface="Lucida Console" panose="020B0609040504020204" pitchFamily="49" charset="0"/>
+              </a:rPr>
+              <a:t>mean</a:t>
+            </a:r>
+          </a:p>
+        </p:txBody>
+      </p:sp>
+    </p:spTree>
+    <p:extLst>
+      <p:ext uri="{BB962C8B-B14F-4D97-AF65-F5344CB8AC3E}">
+        <p14:creationId xmlns:p14="http://schemas.microsoft.com/office/powerpoint/2010/main" val="2060572090"/>
       </p:ext>
     </p:extLst>
   </p:cSld>

</xml_diff>

<commit_message>
Add content to extract operator article explaining how to get help for operators.
</commit_message>
<xml_diff>
--- a/markdown/images/rprog-lexicalScopingDiagrams.pptx
+++ b/markdown/images/rprog-lexicalScopingDiagrams.pptx
@@ -242,7 +242,7 @@
           <a:p>
             <a:fld id="{D14795CE-FEE5-4C90-80CA-081C8D8BCFE0}" type="datetimeFigureOut">
               <a:rPr lang="en-US" smtClean="0"/>
-              <a:t>7/17/2016</a:t>
+              <a:t>7/25/2016</a:t>
             </a:fld>
             <a:endParaRPr lang="en-US"/>
           </a:p>
@@ -410,7 +410,7 @@
           <a:p>
             <a:fld id="{D14795CE-FEE5-4C90-80CA-081C8D8BCFE0}" type="datetimeFigureOut">
               <a:rPr lang="en-US" smtClean="0"/>
-              <a:t>7/17/2016</a:t>
+              <a:t>7/25/2016</a:t>
             </a:fld>
             <a:endParaRPr lang="en-US"/>
           </a:p>
@@ -588,7 +588,7 @@
           <a:p>
             <a:fld id="{D14795CE-FEE5-4C90-80CA-081C8D8BCFE0}" type="datetimeFigureOut">
               <a:rPr lang="en-US" smtClean="0"/>
-              <a:t>7/17/2016</a:t>
+              <a:t>7/25/2016</a:t>
             </a:fld>
             <a:endParaRPr lang="en-US"/>
           </a:p>
@@ -756,7 +756,7 @@
           <a:p>
             <a:fld id="{D14795CE-FEE5-4C90-80CA-081C8D8BCFE0}" type="datetimeFigureOut">
               <a:rPr lang="en-US" smtClean="0"/>
-              <a:t>7/17/2016</a:t>
+              <a:t>7/25/2016</a:t>
             </a:fld>
             <a:endParaRPr lang="en-US"/>
           </a:p>
@@ -1001,7 +1001,7 @@
           <a:p>
             <a:fld id="{D14795CE-FEE5-4C90-80CA-081C8D8BCFE0}" type="datetimeFigureOut">
               <a:rPr lang="en-US" smtClean="0"/>
-              <a:t>7/17/2016</a:t>
+              <a:t>7/25/2016</a:t>
             </a:fld>
             <a:endParaRPr lang="en-US"/>
           </a:p>
@@ -1230,7 +1230,7 @@
           <a:p>
             <a:fld id="{D14795CE-FEE5-4C90-80CA-081C8D8BCFE0}" type="datetimeFigureOut">
               <a:rPr lang="en-US" smtClean="0"/>
-              <a:t>7/17/2016</a:t>
+              <a:t>7/25/2016</a:t>
             </a:fld>
             <a:endParaRPr lang="en-US"/>
           </a:p>
@@ -1594,7 +1594,7 @@
           <a:p>
             <a:fld id="{D14795CE-FEE5-4C90-80CA-081C8D8BCFE0}" type="datetimeFigureOut">
               <a:rPr lang="en-US" smtClean="0"/>
-              <a:t>7/17/2016</a:t>
+              <a:t>7/25/2016</a:t>
             </a:fld>
             <a:endParaRPr lang="en-US"/>
           </a:p>
@@ -1711,7 +1711,7 @@
           <a:p>
             <a:fld id="{D14795CE-FEE5-4C90-80CA-081C8D8BCFE0}" type="datetimeFigureOut">
               <a:rPr lang="en-US" smtClean="0"/>
-              <a:t>7/17/2016</a:t>
+              <a:t>7/25/2016</a:t>
             </a:fld>
             <a:endParaRPr lang="en-US"/>
           </a:p>
@@ -1806,7 +1806,7 @@
           <a:p>
             <a:fld id="{D14795CE-FEE5-4C90-80CA-081C8D8BCFE0}" type="datetimeFigureOut">
               <a:rPr lang="en-US" smtClean="0"/>
-              <a:t>7/17/2016</a:t>
+              <a:t>7/25/2016</a:t>
             </a:fld>
             <a:endParaRPr lang="en-US"/>
           </a:p>
@@ -2081,7 +2081,7 @@
           <a:p>
             <a:fld id="{D14795CE-FEE5-4C90-80CA-081C8D8BCFE0}" type="datetimeFigureOut">
               <a:rPr lang="en-US" smtClean="0"/>
-              <a:t>7/17/2016</a:t>
+              <a:t>7/25/2016</a:t>
             </a:fld>
             <a:endParaRPr lang="en-US"/>
           </a:p>
@@ -2333,7 +2333,7 @@
           <a:p>
             <a:fld id="{D14795CE-FEE5-4C90-80CA-081C8D8BCFE0}" type="datetimeFigureOut">
               <a:rPr lang="en-US" smtClean="0"/>
-              <a:t>7/17/2016</a:t>
+              <a:t>7/25/2016</a:t>
             </a:fld>
             <a:endParaRPr lang="en-US"/>
           </a:p>
@@ -2544,7 +2544,7 @@
           <a:p>
             <a:fld id="{D14795CE-FEE5-4C90-80CA-081C8D8BCFE0}" type="datetimeFigureOut">
               <a:rPr lang="en-US" smtClean="0"/>
-              <a:t>7/17/2016</a:t>
+              <a:t>7/25/2016</a:t>
             </a:fld>
             <a:endParaRPr lang="en-US"/>
           </a:p>
@@ -3078,7 +3078,7 @@
         <p:spPr>
           <a:xfrm>
             <a:off x="938015" y="1566277"/>
-            <a:ext cx="2406428" cy="338554"/>
+            <a:ext cx="1789272" cy="338554"/>
           </a:xfrm>
           <a:prstGeom prst="rect">
             <a:avLst/>
@@ -3095,7 +3095,7 @@
               <a:rPr lang="en-US" sz="1600" dirty="0" err="1">
                 <a:latin typeface="Lucida Console" panose="020B0609040504020204" pitchFamily="49" charset="0"/>
               </a:rPr>
-              <a:t>makeCacheVector</a:t>
+              <a:t>makeVector</a:t>
             </a:r>
             <a:r>
               <a:rPr lang="en-US" sz="1600" dirty="0">

</xml_diff>